<commit_message>
update chapter 16, 19
Co-authored-by: Sunwoo, Jung <jsunwoo@acp.kr>
</commit_message>
<xml_diff>
--- a/images/cover-wings.pptx
+++ b/images/cover-wings.pptx
@@ -260,7 +260,7 @@
           <a:p>
             <a:fld id="{841E8393-F563-43E9-82DD-B243152791BF}" type="datetimeFigureOut">
               <a:rPr lang="en-US" smtClean="0"/>
-              <a:t>7/31/2020</a:t>
+              <a:t>8/21/2020</a:t>
             </a:fld>
             <a:endParaRPr lang="en-US"/>
           </a:p>
@@ -430,7 +430,7 @@
           <a:p>
             <a:fld id="{841E8393-F563-43E9-82DD-B243152791BF}" type="datetimeFigureOut">
               <a:rPr lang="en-US" smtClean="0"/>
-              <a:t>7/31/2020</a:t>
+              <a:t>8/21/2020</a:t>
             </a:fld>
             <a:endParaRPr lang="en-US"/>
           </a:p>
@@ -610,7 +610,7 @@
           <a:p>
             <a:fld id="{841E8393-F563-43E9-82DD-B243152791BF}" type="datetimeFigureOut">
               <a:rPr lang="en-US" smtClean="0"/>
-              <a:t>7/31/2020</a:t>
+              <a:t>8/21/2020</a:t>
             </a:fld>
             <a:endParaRPr lang="en-US"/>
           </a:p>
@@ -780,7 +780,7 @@
           <a:p>
             <a:fld id="{841E8393-F563-43E9-82DD-B243152791BF}" type="datetimeFigureOut">
               <a:rPr lang="en-US" smtClean="0"/>
-              <a:t>7/31/2020</a:t>
+              <a:t>8/21/2020</a:t>
             </a:fld>
             <a:endParaRPr lang="en-US"/>
           </a:p>
@@ -1026,7 +1026,7 @@
           <a:p>
             <a:fld id="{841E8393-F563-43E9-82DD-B243152791BF}" type="datetimeFigureOut">
               <a:rPr lang="en-US" smtClean="0"/>
-              <a:t>7/31/2020</a:t>
+              <a:t>8/21/2020</a:t>
             </a:fld>
             <a:endParaRPr lang="en-US"/>
           </a:p>
@@ -1258,7 +1258,7 @@
           <a:p>
             <a:fld id="{841E8393-F563-43E9-82DD-B243152791BF}" type="datetimeFigureOut">
               <a:rPr lang="en-US" smtClean="0"/>
-              <a:t>7/31/2020</a:t>
+              <a:t>8/21/2020</a:t>
             </a:fld>
             <a:endParaRPr lang="en-US"/>
           </a:p>
@@ -1625,7 +1625,7 @@
           <a:p>
             <a:fld id="{841E8393-F563-43E9-82DD-B243152791BF}" type="datetimeFigureOut">
               <a:rPr lang="en-US" smtClean="0"/>
-              <a:t>7/31/2020</a:t>
+              <a:t>8/21/2020</a:t>
             </a:fld>
             <a:endParaRPr lang="en-US"/>
           </a:p>
@@ -1743,7 +1743,7 @@
           <a:p>
             <a:fld id="{841E8393-F563-43E9-82DD-B243152791BF}" type="datetimeFigureOut">
               <a:rPr lang="en-US" smtClean="0"/>
-              <a:t>7/31/2020</a:t>
+              <a:t>8/21/2020</a:t>
             </a:fld>
             <a:endParaRPr lang="en-US"/>
           </a:p>
@@ -1838,7 +1838,7 @@
           <a:p>
             <a:fld id="{841E8393-F563-43E9-82DD-B243152791BF}" type="datetimeFigureOut">
               <a:rPr lang="en-US" smtClean="0"/>
-              <a:t>7/31/2020</a:t>
+              <a:t>8/21/2020</a:t>
             </a:fld>
             <a:endParaRPr lang="en-US"/>
           </a:p>
@@ -2115,7 +2115,7 @@
           <a:p>
             <a:fld id="{841E8393-F563-43E9-82DD-B243152791BF}" type="datetimeFigureOut">
               <a:rPr lang="en-US" smtClean="0"/>
-              <a:t>7/31/2020</a:t>
+              <a:t>8/21/2020</a:t>
             </a:fld>
             <a:endParaRPr lang="en-US"/>
           </a:p>
@@ -2372,7 +2372,7 @@
           <a:p>
             <a:fld id="{841E8393-F563-43E9-82DD-B243152791BF}" type="datetimeFigureOut">
               <a:rPr lang="en-US" smtClean="0"/>
-              <a:t>7/31/2020</a:t>
+              <a:t>8/21/2020</a:t>
             </a:fld>
             <a:endParaRPr lang="en-US"/>
           </a:p>
@@ -2585,7 +2585,7 @@
           <a:p>
             <a:fld id="{841E8393-F563-43E9-82DD-B243152791BF}" type="datetimeFigureOut">
               <a:rPr lang="en-US" smtClean="0"/>
-              <a:t>7/31/2020</a:t>
+              <a:t>8/21/2020</a:t>
             </a:fld>
             <a:endParaRPr lang="en-US"/>
           </a:p>
@@ -2990,42 +2990,6 @@
           <a:chExt cx="0" cy="0"/>
         </a:xfrm>
       </p:grpSpPr>
-      <p:pic>
-        <p:nvPicPr>
-          <p:cNvPr id="17" name="Picture 16">
-            <a:extLst>
-              <a:ext uri="{FF2B5EF4-FFF2-40B4-BE49-F238E27FC236}">
-                <a16:creationId xmlns:a16="http://schemas.microsoft.com/office/drawing/2014/main" id="{F77411FE-5C26-41B9-8573-0621DA5C5AFD}"/>
-              </a:ext>
-            </a:extLst>
-          </p:cNvPr>
-          <p:cNvPicPr>
-            <a:picLocks noChangeAspect="1"/>
-          </p:cNvPicPr>
-          <p:nvPr/>
-        </p:nvPicPr>
-        <p:blipFill>
-          <a:blip r:embed="rId2">
-            <a:extLst>
-              <a:ext uri="{28A0092B-C50C-407E-A947-70E740481C1C}">
-                <a14:useLocalDpi xmlns:a14="http://schemas.microsoft.com/office/drawing/2010/main"/>
-              </a:ext>
-            </a:extLst>
-          </a:blip>
-          <a:stretch>
-            <a:fillRect/>
-          </a:stretch>
-        </p:blipFill>
-        <p:spPr>
-          <a:xfrm>
-            <a:off x="7413475" y="152187"/>
-            <a:ext cx="22469777" cy="15248364"/>
-          </a:xfrm>
-          <a:prstGeom prst="rect">
-            <a:avLst/>
-          </a:prstGeom>
-        </p:spPr>
-      </p:pic>
       <p:sp>
         <p:nvSpPr>
           <p:cNvPr id="18" name="Rectangle 17">
@@ -3090,6 +3054,39 @@
           </a:p>
         </p:txBody>
       </p:sp>
+      <p:pic>
+        <p:nvPicPr>
+          <p:cNvPr id="2" name="Picture 1">
+            <a:extLst>
+              <a:ext uri="{FF2B5EF4-FFF2-40B4-BE49-F238E27FC236}">
+                <a16:creationId xmlns:a16="http://schemas.microsoft.com/office/drawing/2014/main" id="{56546113-4FE9-4032-83CA-DE888C2E3EE4}"/>
+              </a:ext>
+            </a:extLst>
+          </p:cNvPr>
+          <p:cNvPicPr>
+            <a:picLocks noChangeAspect="1"/>
+          </p:cNvPicPr>
+          <p:nvPr/>
+        </p:nvPicPr>
+        <p:blipFill>
+          <a:blip r:embed="rId2"/>
+          <a:stretch>
+            <a:fillRect/>
+          </a:stretch>
+        </p:blipFill>
+        <p:spPr>
+          <a:xfrm>
+            <a:off x="7407336" y="152187"/>
+            <a:ext cx="22469779" cy="15248364"/>
+          </a:xfrm>
+          <a:prstGeom prst="rect">
+            <a:avLst/>
+          </a:prstGeom>
+          <a:ln>
+            <a:noFill/>
+          </a:ln>
+        </p:spPr>
+      </p:pic>
       <p:sp>
         <p:nvSpPr>
           <p:cNvPr id="19" name="Rectangle 18">
@@ -3442,97 +3439,6 @@
           </a:p>
         </p:txBody>
       </p:sp>
-      <p:grpSp>
-        <p:nvGrpSpPr>
-          <p:cNvPr id="25" name="그룹 9">
-            <a:extLst>
-              <a:ext uri="{FF2B5EF4-FFF2-40B4-BE49-F238E27FC236}">
-                <a16:creationId xmlns:a16="http://schemas.microsoft.com/office/drawing/2014/main" id="{AADF3992-1D18-4A76-B56B-0463386A0509}"/>
-              </a:ext>
-            </a:extLst>
-          </p:cNvPr>
-          <p:cNvGrpSpPr/>
-          <p:nvPr/>
-        </p:nvGrpSpPr>
-        <p:grpSpPr>
-          <a:xfrm>
-            <a:off x="31156396" y="10502488"/>
-            <a:ext cx="5524536" cy="4242012"/>
-            <a:chOff x="4080574" y="1387476"/>
-            <a:chExt cx="5575853" cy="4281417"/>
-          </a:xfrm>
-        </p:grpSpPr>
-        <p:pic>
-          <p:nvPicPr>
-            <p:cNvPr id="26" name="그림 10">
-              <a:extLst>
-                <a:ext uri="{FF2B5EF4-FFF2-40B4-BE49-F238E27FC236}">
-                  <a16:creationId xmlns:a16="http://schemas.microsoft.com/office/drawing/2014/main" id="{3876C450-50AE-4F8D-B148-72E67E1F9D4E}"/>
-                </a:ext>
-              </a:extLst>
-            </p:cNvPr>
-            <p:cNvPicPr>
-              <a:picLocks noChangeAspect="1"/>
-            </p:cNvPicPr>
-            <p:nvPr/>
-          </p:nvPicPr>
-          <p:blipFill rotWithShape="1">
-            <a:blip r:embed="rId3">
-              <a:extLst>
-                <a:ext uri="{28A0092B-C50C-407E-A947-70E740481C1C}">
-                  <a14:useLocalDpi xmlns:a14="http://schemas.microsoft.com/office/drawing/2010/main"/>
-                </a:ext>
-              </a:extLst>
-            </a:blip>
-            <a:srcRect/>
-            <a:stretch/>
-          </p:blipFill>
-          <p:spPr>
-            <a:xfrm>
-              <a:off x="4175673" y="1387476"/>
-              <a:ext cx="5480754" cy="4164108"/>
-            </a:xfrm>
-            <a:prstGeom prst="rect">
-              <a:avLst/>
-            </a:prstGeom>
-          </p:spPr>
-        </p:pic>
-        <p:pic>
-          <p:nvPicPr>
-            <p:cNvPr id="27" name="그림 11">
-              <a:extLst>
-                <a:ext uri="{FF2B5EF4-FFF2-40B4-BE49-F238E27FC236}">
-                  <a16:creationId xmlns:a16="http://schemas.microsoft.com/office/drawing/2014/main" id="{B1AD5AC6-7F89-4062-A53F-A11EB0596ACE}"/>
-                </a:ext>
-              </a:extLst>
-            </p:cNvPr>
-            <p:cNvPicPr>
-              <a:picLocks noChangeAspect="1"/>
-            </p:cNvPicPr>
-            <p:nvPr/>
-          </p:nvPicPr>
-          <p:blipFill rotWithShape="1">
-            <a:blip r:embed="rId4">
-              <a:extLst>
-                <a:ext uri="{28A0092B-C50C-407E-A947-70E740481C1C}">
-                  <a14:useLocalDpi xmlns:a14="http://schemas.microsoft.com/office/drawing/2010/main"/>
-                </a:ext>
-              </a:extLst>
-            </a:blip>
-            <a:srcRect/>
-            <a:stretch/>
-          </p:blipFill>
-          <p:spPr>
-            <a:xfrm>
-              <a:off x="4080574" y="2348916"/>
-              <a:ext cx="5575853" cy="3319977"/>
-            </a:xfrm>
-            <a:prstGeom prst="rect">
-              <a:avLst/>
-            </a:prstGeom>
-          </p:spPr>
-        </p:pic>
-      </p:grpSp>
       <p:sp>
         <p:nvSpPr>
           <p:cNvPr id="28" name="TextBox 27">
@@ -3796,6 +3702,47 @@
           </a:p>
         </p:txBody>
       </p:sp>
+      <p:pic>
+        <p:nvPicPr>
+          <p:cNvPr id="15" name="Picture 14">
+            <a:extLst>
+              <a:ext uri="{FF2B5EF4-FFF2-40B4-BE49-F238E27FC236}">
+                <a16:creationId xmlns:a16="http://schemas.microsoft.com/office/drawing/2014/main" id="{E7EA52B6-899F-4B08-B216-237BBDAD44A9}"/>
+              </a:ext>
+            </a:extLst>
+          </p:cNvPr>
+          <p:cNvPicPr>
+            <a:picLocks noChangeAspect="1"/>
+          </p:cNvPicPr>
+          <p:nvPr/>
+        </p:nvPicPr>
+        <p:blipFill>
+          <a:blip r:embed="rId3">
+            <a:clrChange>
+              <a:clrFrom>
+                <a:srgbClr val="FAFAFA"/>
+              </a:clrFrom>
+              <a:clrTo>
+                <a:srgbClr val="FAFAFA">
+                  <a:alpha val="0"/>
+                </a:srgbClr>
+              </a:clrTo>
+            </a:clrChange>
+          </a:blip>
+          <a:stretch>
+            <a:fillRect/>
+          </a:stretch>
+        </p:blipFill>
+        <p:spPr>
+          <a:xfrm>
+            <a:off x="31190722" y="10495633"/>
+            <a:ext cx="5433060" cy="4244340"/>
+          </a:xfrm>
+          <a:prstGeom prst="rect">
+            <a:avLst/>
+          </a:prstGeom>
+        </p:spPr>
+      </p:pic>
     </p:spTree>
     <p:extLst>
       <p:ext uri="{BB962C8B-B14F-4D97-AF65-F5344CB8AC3E}">

</xml_diff>